<commit_message>
removes news feed components
</commit_message>
<xml_diff>
--- a/extdata/man-zh.pptx
+++ b/extdata/man-zh.pptx
@@ -5,13 +5,16 @@
     <p:sldMasterId id="2147483648" r:id="rId1"/>
   </p:sldMasterIdLst>
   <p:notesMasterIdLst>
-    <p:notesMasterId r:id="rId6"/>
+    <p:notesMasterId r:id="rId9"/>
   </p:notesMasterIdLst>
   <p:sldIdLst>
     <p:sldId id="256" r:id="rId2"/>
     <p:sldId id="282" r:id="rId3"/>
     <p:sldId id="281" r:id="rId4"/>
-    <p:sldId id="260" r:id="rId5"/>
+    <p:sldId id="283" r:id="rId5"/>
+    <p:sldId id="284" r:id="rId6"/>
+    <p:sldId id="285" r:id="rId7"/>
+    <p:sldId id="260" r:id="rId8"/>
   </p:sldIdLst>
   <p:sldSz cx="24384000" cy="13716000"/>
   <p:notesSz cx="6858000" cy="9144000"/>
@@ -556,6 +559,189 @@
 </file>
 
 <file path=ppt/notesSlides/notesSlide2.xml><?xml version="1.0" encoding="utf-8"?>
+<p:notes xmlns:a="http://schemas.openxmlformats.org/drawingml/2006/main" xmlns:r="http://schemas.openxmlformats.org/officeDocument/2006/relationships" xmlns:p="http://schemas.openxmlformats.org/presentationml/2006/main">
+  <p:cSld>
+    <p:spTree>
+      <p:nvGrpSpPr>
+        <p:cNvPr id="1" name=""/>
+        <p:cNvGrpSpPr/>
+        <p:nvPr/>
+      </p:nvGrpSpPr>
+      <p:grpSpPr>
+        <a:xfrm>
+          <a:off x="0" y="0"/>
+          <a:ext cx="0" cy="0"/>
+          <a:chOff x="0" y="0"/>
+          <a:chExt cx="0" cy="0"/>
+        </a:xfrm>
+      </p:grpSpPr>
+      <p:sp>
+        <p:nvSpPr>
+          <p:cNvPr id="2" name="幻灯片图像占位符 1"/>
+          <p:cNvSpPr>
+            <a:spLocks noGrp="1" noRot="1" noChangeAspect="1"/>
+          </p:cNvSpPr>
+          <p:nvPr>
+            <p:ph type="sldImg"/>
+          </p:nvPr>
+        </p:nvSpPr>
+        <p:spPr>
+          <a:xfrm>
+            <a:off x="381000" y="685800"/>
+            <a:ext cx="6096000" cy="3429000"/>
+          </a:xfrm>
+        </p:spPr>
+      </p:sp>
+      <p:sp>
+        <p:nvSpPr>
+          <p:cNvPr id="3" name="备注占位符 2"/>
+          <p:cNvSpPr>
+            <a:spLocks noGrp="1"/>
+          </p:cNvSpPr>
+          <p:nvPr>
+            <p:ph type="body" idx="1"/>
+          </p:nvPr>
+        </p:nvSpPr>
+        <p:spPr/>
+        <p:txBody>
+          <a:bodyPr/>
+          <a:lstStyle/>
+          <a:p>
+            <a:endParaRPr lang="zh-CN" altLang="en-US" dirty="0"/>
+          </a:p>
+        </p:txBody>
+      </p:sp>
+    </p:spTree>
+  </p:cSld>
+  <p:clrMapOvr>
+    <a:masterClrMapping/>
+  </p:clrMapOvr>
+</p:notes>
+</file>
+
+<file path=ppt/notesSlides/notesSlide3.xml><?xml version="1.0" encoding="utf-8"?>
+<p:notes xmlns:a="http://schemas.openxmlformats.org/drawingml/2006/main" xmlns:r="http://schemas.openxmlformats.org/officeDocument/2006/relationships" xmlns:p="http://schemas.openxmlformats.org/presentationml/2006/main">
+  <p:cSld>
+    <p:spTree>
+      <p:nvGrpSpPr>
+        <p:cNvPr id="1" name=""/>
+        <p:cNvGrpSpPr/>
+        <p:nvPr/>
+      </p:nvGrpSpPr>
+      <p:grpSpPr>
+        <a:xfrm>
+          <a:off x="0" y="0"/>
+          <a:ext cx="0" cy="0"/>
+          <a:chOff x="0" y="0"/>
+          <a:chExt cx="0" cy="0"/>
+        </a:xfrm>
+      </p:grpSpPr>
+      <p:sp>
+        <p:nvSpPr>
+          <p:cNvPr id="2" name="幻灯片图像占位符 1"/>
+          <p:cNvSpPr>
+            <a:spLocks noGrp="1" noRot="1" noChangeAspect="1"/>
+          </p:cNvSpPr>
+          <p:nvPr>
+            <p:ph type="sldImg"/>
+          </p:nvPr>
+        </p:nvSpPr>
+        <p:spPr>
+          <a:xfrm>
+            <a:off x="381000" y="685800"/>
+            <a:ext cx="6096000" cy="3429000"/>
+          </a:xfrm>
+        </p:spPr>
+      </p:sp>
+      <p:sp>
+        <p:nvSpPr>
+          <p:cNvPr id="3" name="备注占位符 2"/>
+          <p:cNvSpPr>
+            <a:spLocks noGrp="1"/>
+          </p:cNvSpPr>
+          <p:nvPr>
+            <p:ph type="body" idx="1"/>
+          </p:nvPr>
+        </p:nvSpPr>
+        <p:spPr/>
+        <p:txBody>
+          <a:bodyPr/>
+          <a:lstStyle/>
+          <a:p>
+            <a:endParaRPr lang="zh-CN" altLang="en-US" dirty="0"/>
+          </a:p>
+        </p:txBody>
+      </p:sp>
+    </p:spTree>
+  </p:cSld>
+  <p:clrMapOvr>
+    <a:masterClrMapping/>
+  </p:clrMapOvr>
+</p:notes>
+</file>
+
+<file path=ppt/notesSlides/notesSlide4.xml><?xml version="1.0" encoding="utf-8"?>
+<p:notes xmlns:a="http://schemas.openxmlformats.org/drawingml/2006/main" xmlns:r="http://schemas.openxmlformats.org/officeDocument/2006/relationships" xmlns:p="http://schemas.openxmlformats.org/presentationml/2006/main">
+  <p:cSld>
+    <p:spTree>
+      <p:nvGrpSpPr>
+        <p:cNvPr id="1" name=""/>
+        <p:cNvGrpSpPr/>
+        <p:nvPr/>
+      </p:nvGrpSpPr>
+      <p:grpSpPr>
+        <a:xfrm>
+          <a:off x="0" y="0"/>
+          <a:ext cx="0" cy="0"/>
+          <a:chOff x="0" y="0"/>
+          <a:chExt cx="0" cy="0"/>
+        </a:xfrm>
+      </p:grpSpPr>
+      <p:sp>
+        <p:nvSpPr>
+          <p:cNvPr id="2" name="幻灯片图像占位符 1"/>
+          <p:cNvSpPr>
+            <a:spLocks noGrp="1" noRot="1" noChangeAspect="1"/>
+          </p:cNvSpPr>
+          <p:nvPr>
+            <p:ph type="sldImg"/>
+          </p:nvPr>
+        </p:nvSpPr>
+        <p:spPr>
+          <a:xfrm>
+            <a:off x="381000" y="685800"/>
+            <a:ext cx="6096000" cy="3429000"/>
+          </a:xfrm>
+        </p:spPr>
+      </p:sp>
+      <p:sp>
+        <p:nvSpPr>
+          <p:cNvPr id="3" name="备注占位符 2"/>
+          <p:cNvSpPr>
+            <a:spLocks noGrp="1"/>
+          </p:cNvSpPr>
+          <p:nvPr>
+            <p:ph type="body" idx="1"/>
+          </p:nvPr>
+        </p:nvSpPr>
+        <p:spPr/>
+        <p:txBody>
+          <a:bodyPr/>
+          <a:lstStyle/>
+          <a:p>
+            <a:endParaRPr lang="zh-CN" altLang="en-US" dirty="0"/>
+          </a:p>
+        </p:txBody>
+      </p:sp>
+    </p:spTree>
+  </p:cSld>
+  <p:clrMapOvr>
+    <a:masterClrMapping/>
+  </p:clrMapOvr>
+</p:notes>
+</file>
+
+<file path=ppt/notesSlides/notesSlide5.xml><?xml version="1.0" encoding="utf-8"?>
 <p:notes xmlns:a="http://schemas.openxmlformats.org/drawingml/2006/main" xmlns:r="http://schemas.openxmlformats.org/officeDocument/2006/relationships" xmlns:p="http://schemas.openxmlformats.org/presentationml/2006/main">
   <p:cSld>
     <p:spTree>
@@ -2389,6 +2575,976 @@
       </p:grpSpPr>
       <p:pic>
         <p:nvPicPr>
+          <p:cNvPr id="1027" name="Picture 3"/>
+          <p:cNvPicPr>
+            <a:picLocks noChangeAspect="1" noChangeArrowheads="1"/>
+          </p:cNvPicPr>
+          <p:nvPr/>
+        </p:nvPicPr>
+        <p:blipFill>
+          <a:blip r:embed="rId3">
+            <a:extLst>
+              <a:ext uri="{28A0092B-C50C-407E-A947-70E740481C1C}">
+                <a14:useLocalDpi xmlns:a14="http://schemas.microsoft.com/office/drawing/2010/main" val="0"/>
+              </a:ext>
+            </a:extLst>
+          </a:blip>
+          <a:srcRect/>
+          <a:stretch>
+            <a:fillRect/>
+          </a:stretch>
+        </p:blipFill>
+        <p:spPr bwMode="auto">
+          <a:xfrm>
+            <a:off x="8663608" y="32970"/>
+            <a:ext cx="8111327" cy="6903510"/>
+          </a:xfrm>
+          <a:prstGeom prst="rect">
+            <a:avLst/>
+          </a:prstGeom>
+          <a:noFill/>
+          <a:ln>
+            <a:noFill/>
+          </a:ln>
+          <a:extLst>
+            <a:ext uri="{909E8E84-426E-40DD-AFC4-6F175D3DCCD1}">
+              <a14:hiddenFill xmlns:a14="http://schemas.microsoft.com/office/drawing/2010/main">
+                <a:solidFill>
+                  <a:schemeClr val="accent1"/>
+                </a:solidFill>
+              </a14:hiddenFill>
+            </a:ext>
+            <a:ext uri="{91240B29-F687-4F45-9708-019B960494DF}">
+              <a14:hiddenLine xmlns:a14="http://schemas.microsoft.com/office/drawing/2010/main" w="9525">
+                <a:solidFill>
+                  <a:schemeClr val="tx1"/>
+                </a:solidFill>
+                <a:miter lim="800000"/>
+                <a:headEnd/>
+                <a:tailEnd/>
+              </a14:hiddenLine>
+            </a:ext>
+          </a:extLst>
+        </p:spPr>
+      </p:pic>
+      <p:pic>
+        <p:nvPicPr>
+          <p:cNvPr id="1028" name="Picture 4"/>
+          <p:cNvPicPr>
+            <a:picLocks noChangeAspect="1" noChangeArrowheads="1"/>
+          </p:cNvPicPr>
+          <p:nvPr/>
+        </p:nvPicPr>
+        <p:blipFill>
+          <a:blip r:embed="rId4">
+            <a:extLst>
+              <a:ext uri="{28A0092B-C50C-407E-A947-70E740481C1C}">
+                <a14:useLocalDpi xmlns:a14="http://schemas.microsoft.com/office/drawing/2010/main" val="0"/>
+              </a:ext>
+            </a:extLst>
+          </a:blip>
+          <a:srcRect/>
+          <a:stretch>
+            <a:fillRect/>
+          </a:stretch>
+        </p:blipFill>
+        <p:spPr bwMode="auto">
+          <a:xfrm>
+            <a:off x="16629437" y="2137935"/>
+            <a:ext cx="7754563" cy="6624915"/>
+          </a:xfrm>
+          <a:prstGeom prst="rect">
+            <a:avLst/>
+          </a:prstGeom>
+          <a:noFill/>
+          <a:ln>
+            <a:noFill/>
+          </a:ln>
+          <a:extLst>
+            <a:ext uri="{909E8E84-426E-40DD-AFC4-6F175D3DCCD1}">
+              <a14:hiddenFill xmlns:a14="http://schemas.microsoft.com/office/drawing/2010/main">
+                <a:solidFill>
+                  <a:schemeClr val="accent1"/>
+                </a:solidFill>
+              </a14:hiddenFill>
+            </a:ext>
+            <a:ext uri="{91240B29-F687-4F45-9708-019B960494DF}">
+              <a14:hiddenLine xmlns:a14="http://schemas.microsoft.com/office/drawing/2010/main" w="9525">
+                <a:solidFill>
+                  <a:schemeClr val="tx1"/>
+                </a:solidFill>
+                <a:miter lim="800000"/>
+                <a:headEnd/>
+                <a:tailEnd/>
+              </a14:hiddenLine>
+            </a:ext>
+          </a:extLst>
+        </p:spPr>
+      </p:pic>
+      <p:pic>
+        <p:nvPicPr>
+          <p:cNvPr id="1029" name="Picture 5"/>
+          <p:cNvPicPr>
+            <a:picLocks noChangeAspect="1" noChangeArrowheads="1"/>
+          </p:cNvPicPr>
+          <p:nvPr/>
+        </p:nvPicPr>
+        <p:blipFill>
+          <a:blip r:embed="rId5">
+            <a:extLst>
+              <a:ext uri="{28A0092B-C50C-407E-A947-70E740481C1C}">
+                <a14:useLocalDpi xmlns:a14="http://schemas.microsoft.com/office/drawing/2010/main" val="0"/>
+              </a:ext>
+            </a:extLst>
+          </a:blip>
+          <a:srcRect/>
+          <a:stretch>
+            <a:fillRect/>
+          </a:stretch>
+        </p:blipFill>
+        <p:spPr bwMode="auto">
+          <a:xfrm>
+            <a:off x="8311858" y="6853369"/>
+            <a:ext cx="7760281" cy="6624915"/>
+          </a:xfrm>
+          <a:prstGeom prst="rect">
+            <a:avLst/>
+          </a:prstGeom>
+          <a:noFill/>
+          <a:ln>
+            <a:noFill/>
+          </a:ln>
+          <a:extLst>
+            <a:ext uri="{909E8E84-426E-40DD-AFC4-6F175D3DCCD1}">
+              <a14:hiddenFill xmlns:a14="http://schemas.microsoft.com/office/drawing/2010/main">
+                <a:solidFill>
+                  <a:schemeClr val="accent1"/>
+                </a:solidFill>
+              </a14:hiddenFill>
+            </a:ext>
+            <a:ext uri="{91240B29-F687-4F45-9708-019B960494DF}">
+              <a14:hiddenLine xmlns:a14="http://schemas.microsoft.com/office/drawing/2010/main" w="9525">
+                <a:solidFill>
+                  <a:schemeClr val="tx1"/>
+                </a:solidFill>
+                <a:miter lim="800000"/>
+                <a:headEnd/>
+                <a:tailEnd/>
+              </a14:hiddenLine>
+            </a:ext>
+          </a:extLst>
+        </p:spPr>
+      </p:pic>
+      <p:pic>
+        <p:nvPicPr>
+          <p:cNvPr id="153" name="图像" descr="图像"/>
+          <p:cNvPicPr>
+            <a:picLocks noChangeAspect="1"/>
+          </p:cNvPicPr>
+          <p:nvPr/>
+        </p:nvPicPr>
+        <p:blipFill>
+          <a:blip r:embed="rId6"/>
+          <a:stretch>
+            <a:fillRect/>
+          </a:stretch>
+        </p:blipFill>
+        <p:spPr>
+          <a:xfrm>
+            <a:off x="-1" y="755652"/>
+            <a:ext cx="24384001" cy="952498"/>
+          </a:xfrm>
+          <a:prstGeom prst="rect">
+            <a:avLst/>
+          </a:prstGeom>
+          <a:ln w="12700">
+            <a:miter lim="400000"/>
+            <a:headEnd/>
+            <a:tailEnd/>
+          </a:ln>
+        </p:spPr>
+      </p:pic>
+      <p:pic>
+        <p:nvPicPr>
+          <p:cNvPr id="154" name="图像" descr="图像"/>
+          <p:cNvPicPr>
+            <a:picLocks noChangeAspect="1"/>
+          </p:cNvPicPr>
+          <p:nvPr/>
+        </p:nvPicPr>
+        <p:blipFill>
+          <a:blip r:embed="rId7"/>
+          <a:stretch>
+            <a:fillRect/>
+          </a:stretch>
+        </p:blipFill>
+        <p:spPr>
+          <a:xfrm>
+            <a:off x="18528704" y="8762850"/>
+            <a:ext cx="5855296" cy="4953149"/>
+          </a:xfrm>
+          <a:prstGeom prst="rect">
+            <a:avLst/>
+          </a:prstGeom>
+          <a:ln w="12700">
+            <a:miter lim="400000"/>
+            <a:headEnd/>
+            <a:tailEnd/>
+          </a:ln>
+        </p:spPr>
+      </p:pic>
+      <p:sp>
+        <p:nvSpPr>
+          <p:cNvPr id="155" name="内容标题（55点75w）"/>
+          <p:cNvSpPr txBox="1"/>
+          <p:nvPr/>
+        </p:nvSpPr>
+        <p:spPr>
+          <a:xfrm>
+            <a:off x="696721" y="719311"/>
+            <a:ext cx="4353756" cy="948978"/>
+          </a:xfrm>
+          <a:prstGeom prst="rect">
+            <a:avLst/>
+          </a:prstGeom>
+          <a:ln w="12700">
+            <a:miter lim="400000"/>
+          </a:ln>
+        </p:spPr>
+        <p:txBody>
+          <a:bodyPr wrap="none" lIns="50800" tIns="50800" rIns="50800" bIns="50800" anchor="ctr">
+            <a:spAutoFit/>
+          </a:bodyPr>
+          <a:lstStyle>
+            <a:lvl1pPr algn="l">
+              <a:defRPr sz="5500">
+                <a:solidFill>
+                  <a:srgbClr val="555E63"/>
+                </a:solidFill>
+                <a:latin typeface="HYQiHei-GEW"/>
+                <a:ea typeface="HYQiHei-GEW"/>
+                <a:cs typeface="HYQiHei-GEW"/>
+                <a:sym typeface="HYQiHei-GEW"/>
+              </a:defRPr>
+            </a:lvl1pPr>
+          </a:lstStyle>
+          <a:p>
+            <a:r>
+              <a:rPr lang="zh-CN" altLang="en-US" dirty="0" smtClean="0"/>
+              <a:t>软件安装讲解</a:t>
+            </a:r>
+            <a:endParaRPr lang="zh-CN" altLang="en-US" dirty="0" smtClean="0"/>
+          </a:p>
+        </p:txBody>
+      </p:sp>
+      <p:pic>
+        <p:nvPicPr>
+          <p:cNvPr id="1026" name="Picture 2"/>
+          <p:cNvPicPr>
+            <a:picLocks noChangeAspect="1" noChangeArrowheads="1"/>
+          </p:cNvPicPr>
+          <p:nvPr/>
+        </p:nvPicPr>
+        <p:blipFill>
+          <a:blip r:embed="rId8">
+            <a:extLst>
+              <a:ext uri="{28A0092B-C50C-407E-A947-70E740481C1C}">
+                <a14:useLocalDpi xmlns:a14="http://schemas.microsoft.com/office/drawing/2010/main" val="0"/>
+              </a:ext>
+            </a:extLst>
+          </a:blip>
+          <a:srcRect/>
+          <a:stretch>
+            <a:fillRect/>
+          </a:stretch>
+        </p:blipFill>
+        <p:spPr bwMode="auto">
+          <a:xfrm>
+            <a:off x="546182" y="1921607"/>
+            <a:ext cx="5854262" cy="3280209"/>
+          </a:xfrm>
+          <a:prstGeom prst="rect">
+            <a:avLst/>
+          </a:prstGeom>
+          <a:noFill/>
+          <a:ln>
+            <a:noFill/>
+          </a:ln>
+          <a:extLst>
+            <a:ext uri="{909E8E84-426E-40DD-AFC4-6F175D3DCCD1}">
+              <a14:hiddenFill xmlns:a14="http://schemas.microsoft.com/office/drawing/2010/main">
+                <a:solidFill>
+                  <a:schemeClr val="accent1"/>
+                </a:solidFill>
+              </a14:hiddenFill>
+            </a:ext>
+            <a:ext uri="{91240B29-F687-4F45-9708-019B960494DF}">
+              <a14:hiddenLine xmlns:a14="http://schemas.microsoft.com/office/drawing/2010/main" w="9525">
+                <a:solidFill>
+                  <a:schemeClr val="tx1"/>
+                </a:solidFill>
+                <a:miter lim="800000"/>
+                <a:headEnd/>
+                <a:tailEnd/>
+              </a14:hiddenLine>
+            </a:ext>
+          </a:extLst>
+        </p:spPr>
+      </p:pic>
+      <p:sp>
+        <p:nvSpPr>
+          <p:cNvPr id="2" name="TextBox 1"/>
+          <p:cNvSpPr txBox="1"/>
+          <p:nvPr/>
+        </p:nvSpPr>
+        <p:spPr>
+          <a:xfrm>
+            <a:off x="413007" y="5280663"/>
+            <a:ext cx="8454237" cy="3980577"/>
+          </a:xfrm>
+          <a:prstGeom prst="rect">
+            <a:avLst/>
+          </a:prstGeom>
+          <a:noFill/>
+          <a:ln w="12700" cap="flat">
+            <a:noFill/>
+            <a:miter lim="400000"/>
+          </a:ln>
+        </p:spPr>
+        <p:style>
+          <a:lnRef idx="0">
+            <a:scrgbClr r="0" g="0" b="0"/>
+          </a:lnRef>
+          <a:fillRef idx="0">
+            <a:scrgbClr r="0" g="0" b="0"/>
+          </a:fillRef>
+          <a:effectRef idx="0">
+            <a:scrgbClr r="0" g="0" b="0"/>
+          </a:effectRef>
+          <a:fontRef idx="none"/>
+        </p:style>
+        <p:txBody>
+          <a:bodyPr rot="0" spcFirstLastPara="1" vertOverflow="overflow" horzOverflow="overflow" vert="horz" wrap="none" lIns="50800" tIns="50800" rIns="50800" bIns="50800" numCol="1" spcCol="38100" rtlCol="0" anchor="ctr">
+            <a:spAutoFit/>
+          </a:bodyPr>
+          <a:lstStyle/>
+          <a:p>
+            <a:pPr marL="0" marR="0" indent="0" algn="ctr" defTabSz="825500" rtl="0" fontAlgn="auto" latinLnBrk="0" hangingPunct="0">
+              <a:lnSpc>
+                <a:spcPct val="100000"/>
+              </a:lnSpc>
+              <a:spcBef>
+                <a:spcPts val="0"/>
+              </a:spcBef>
+              <a:spcAft>
+                <a:spcPts val="0"/>
+              </a:spcAft>
+              <a:buClrTx/>
+              <a:buSzTx/>
+              <a:buFontTx/>
+              <a:buNone/>
+            </a:pPr>
+            <a:r>
+              <a:rPr kumimoji="0" lang="zh-CN" altLang="en-US" sz="3600" b="1" i="0" u="none" strike="noStrike" cap="none" spc="0" normalizeH="0" baseline="0" dirty="0" smtClean="0">
+                <a:ln>
+                  <a:noFill/>
+                </a:ln>
+                <a:solidFill>
+                  <a:srgbClr val="000000"/>
+                </a:solidFill>
+                <a:effectLst/>
+                <a:uFillTx/>
+                <a:sym typeface="Helvetica Neue"/>
+              </a:rPr>
+              <a:t>双击</a:t>
+            </a:r>
+            <a:r>
+              <a:rPr kumimoji="0" lang="en-US" altLang="zh-CN" sz="3600" b="1" i="0" u="none" strike="noStrike" cap="none" spc="0" normalizeH="0" baseline="0" dirty="0" smtClean="0">
+                <a:ln>
+                  <a:noFill/>
+                </a:ln>
+                <a:solidFill>
+                  <a:srgbClr val="000000"/>
+                </a:solidFill>
+                <a:effectLst/>
+                <a:uFillTx/>
+                <a:sym typeface="Helvetica Neue"/>
+              </a:rPr>
+              <a:t>【mzkit_setups.exe】</a:t>
+            </a:r>
+            <a:r>
+              <a:rPr kumimoji="0" lang="zh-CN" altLang="en-US" sz="3600" b="1" i="0" u="none" strike="noStrike" cap="none" spc="0" normalizeH="0" baseline="0" dirty="0" smtClean="0">
+                <a:ln>
+                  <a:noFill/>
+                </a:ln>
+                <a:solidFill>
+                  <a:srgbClr val="000000"/>
+                </a:solidFill>
+                <a:effectLst/>
+                <a:uFillTx/>
+                <a:sym typeface="Helvetica Neue"/>
+              </a:rPr>
+              <a:t>打开安装程序</a:t>
+            </a:r>
+            <a:endParaRPr kumimoji="0" lang="en-US" altLang="zh-CN" sz="3600" b="1" i="0" u="none" strike="noStrike" cap="none" spc="0" normalizeH="0" baseline="0" dirty="0" smtClean="0">
+              <a:ln>
+                <a:noFill/>
+              </a:ln>
+              <a:solidFill>
+                <a:srgbClr val="000000"/>
+              </a:solidFill>
+              <a:effectLst/>
+              <a:uFillTx/>
+              <a:sym typeface="Helvetica Neue"/>
+            </a:endParaRPr>
+          </a:p>
+          <a:p>
+            <a:pPr marL="0" marR="0" indent="0" algn="ctr" defTabSz="825500" rtl="0" fontAlgn="auto" latinLnBrk="0" hangingPunct="0">
+              <a:lnSpc>
+                <a:spcPct val="100000"/>
+              </a:lnSpc>
+              <a:spcBef>
+                <a:spcPts val="0"/>
+              </a:spcBef>
+              <a:spcAft>
+                <a:spcPts val="0"/>
+              </a:spcAft>
+              <a:buClrTx/>
+              <a:buSzTx/>
+              <a:buFontTx/>
+              <a:buNone/>
+            </a:pPr>
+            <a:endParaRPr lang="en-US" altLang="zh-CN" sz="3600" dirty="0"/>
+          </a:p>
+          <a:p>
+            <a:pPr marL="0" marR="0" indent="0" algn="l" defTabSz="825500" rtl="0" fontAlgn="auto" latinLnBrk="0" hangingPunct="0">
+              <a:lnSpc>
+                <a:spcPct val="100000"/>
+              </a:lnSpc>
+              <a:spcBef>
+                <a:spcPts val="0"/>
+              </a:spcBef>
+              <a:spcAft>
+                <a:spcPts val="0"/>
+              </a:spcAft>
+              <a:buClrTx/>
+              <a:buSzTx/>
+              <a:buFontTx/>
+              <a:buNone/>
+            </a:pPr>
+            <a:r>
+              <a:rPr kumimoji="0" lang="zh-CN" altLang="en-US" sz="3600" b="1" i="0" u="none" strike="noStrike" cap="none" spc="0" normalizeH="0" baseline="0" dirty="0" smtClean="0">
+                <a:ln>
+                  <a:noFill/>
+                </a:ln>
+                <a:solidFill>
+                  <a:srgbClr val="000000"/>
+                </a:solidFill>
+                <a:effectLst/>
+                <a:uFillTx/>
+                <a:sym typeface="Helvetica Neue"/>
+              </a:rPr>
+              <a:t>运行环境需求：</a:t>
+            </a:r>
+            <a:endParaRPr kumimoji="0" lang="en-US" altLang="zh-CN" sz="3600" b="1" i="0" u="none" strike="noStrike" cap="none" spc="0" normalizeH="0" baseline="0" dirty="0" smtClean="0">
+              <a:ln>
+                <a:noFill/>
+              </a:ln>
+              <a:solidFill>
+                <a:srgbClr val="000000"/>
+              </a:solidFill>
+              <a:effectLst/>
+              <a:uFillTx/>
+              <a:sym typeface="Helvetica Neue"/>
+            </a:endParaRPr>
+          </a:p>
+          <a:p>
+            <a:pPr marL="514350" marR="0" indent="-514350" algn="l" defTabSz="825500" rtl="0" fontAlgn="auto" latinLnBrk="0" hangingPunct="0">
+              <a:lnSpc>
+                <a:spcPct val="100000"/>
+              </a:lnSpc>
+              <a:spcBef>
+                <a:spcPts val="0"/>
+              </a:spcBef>
+              <a:spcAft>
+                <a:spcPts val="0"/>
+              </a:spcAft>
+              <a:buClrTx/>
+              <a:buSzTx/>
+              <a:buFontTx/>
+              <a:buAutoNum type="arabicPeriod"/>
+            </a:pPr>
+            <a:r>
+              <a:rPr lang="en-US" altLang="zh-CN" sz="3600" dirty="0" smtClean="0"/>
+              <a:t>Windows 10/11 x64</a:t>
+            </a:r>
+          </a:p>
+          <a:p>
+            <a:pPr marL="514350" marR="0" indent="-514350" algn="l" defTabSz="825500" rtl="0" fontAlgn="auto" latinLnBrk="0" hangingPunct="0">
+              <a:lnSpc>
+                <a:spcPct val="100000"/>
+              </a:lnSpc>
+              <a:spcBef>
+                <a:spcPts val="0"/>
+              </a:spcBef>
+              <a:spcAft>
+                <a:spcPts val="0"/>
+              </a:spcAft>
+              <a:buClrTx/>
+              <a:buSzTx/>
+              <a:buFontTx/>
+              <a:buAutoNum type="arabicPeriod"/>
+            </a:pPr>
+            <a:r>
+              <a:rPr lang="zh-CN" altLang="en-US" sz="3600" dirty="0" smtClean="0"/>
+              <a:t>屏幕分辨率 </a:t>
+            </a:r>
+            <a:r>
+              <a:rPr lang="en-US" altLang="zh-CN" sz="3600" dirty="0" smtClean="0"/>
+              <a:t>1600*1080 </a:t>
+            </a:r>
+            <a:r>
+              <a:rPr lang="zh-CN" altLang="en-US" sz="3600" dirty="0" smtClean="0"/>
+              <a:t>或以上</a:t>
+            </a:r>
+            <a:endParaRPr lang="en-US" altLang="zh-CN" sz="3600" dirty="0" smtClean="0"/>
+          </a:p>
+          <a:p>
+            <a:pPr marL="514350" marR="0" indent="-514350" algn="l" defTabSz="825500" rtl="0" fontAlgn="auto" latinLnBrk="0" hangingPunct="0">
+              <a:lnSpc>
+                <a:spcPct val="100000"/>
+              </a:lnSpc>
+              <a:spcBef>
+                <a:spcPts val="0"/>
+              </a:spcBef>
+              <a:spcAft>
+                <a:spcPts val="0"/>
+              </a:spcAft>
+              <a:buClrTx/>
+              <a:buSzTx/>
+              <a:buFontTx/>
+              <a:buAutoNum type="arabicPeriod"/>
+            </a:pPr>
+            <a:r>
+              <a:rPr kumimoji="0" lang="en-US" altLang="zh-CN" sz="3600" b="1" i="0" u="none" strike="noStrike" cap="none" spc="0" normalizeH="0" baseline="0" dirty="0" smtClean="0">
+                <a:ln>
+                  <a:noFill/>
+                </a:ln>
+                <a:solidFill>
+                  <a:srgbClr val="000000"/>
+                </a:solidFill>
+                <a:effectLst/>
+                <a:uFillTx/>
+                <a:sym typeface="Helvetica Neue"/>
+              </a:rPr>
+              <a:t>.NET Framework 4.8 mzkit_win32</a:t>
+            </a:r>
+          </a:p>
+          <a:p>
+            <a:pPr marL="514350" marR="0" indent="-514350" algn="l" defTabSz="825500" rtl="0" fontAlgn="auto" latinLnBrk="0" hangingPunct="0">
+              <a:lnSpc>
+                <a:spcPct val="100000"/>
+              </a:lnSpc>
+              <a:spcBef>
+                <a:spcPts val="0"/>
+              </a:spcBef>
+              <a:spcAft>
+                <a:spcPts val="0"/>
+              </a:spcAft>
+              <a:buClrTx/>
+              <a:buSzTx/>
+              <a:buFontTx/>
+              <a:buAutoNum type="arabicPeriod"/>
+            </a:pPr>
+            <a:r>
+              <a:rPr lang="en-US" altLang="zh-CN" sz="3600" dirty="0" smtClean="0"/>
+              <a:t>.NET 6.0 </a:t>
+            </a:r>
+            <a:r>
+              <a:rPr lang="en-US" altLang="zh-CN" sz="3600" dirty="0" err="1" smtClean="0"/>
+              <a:t>mzkit_server</a:t>
+            </a:r>
+            <a:endParaRPr kumimoji="0" lang="zh-CN" altLang="en-US" sz="3600" b="1" i="0" u="none" strike="noStrike" cap="none" spc="0" normalizeH="0" baseline="0" dirty="0">
+              <a:ln>
+                <a:noFill/>
+              </a:ln>
+              <a:solidFill>
+                <a:srgbClr val="000000"/>
+              </a:solidFill>
+              <a:effectLst/>
+              <a:uFillTx/>
+              <a:sym typeface="Helvetica Neue"/>
+            </a:endParaRPr>
+          </a:p>
+        </p:txBody>
+      </p:sp>
+      <p:sp>
+        <p:nvSpPr>
+          <p:cNvPr id="3" name="右箭头 2"/>
+          <p:cNvSpPr/>
+          <p:nvPr/>
+        </p:nvSpPr>
+        <p:spPr>
+          <a:xfrm>
+            <a:off x="6266441" y="3152521"/>
+            <a:ext cx="1461063" cy="818380"/>
+          </a:xfrm>
+          <a:prstGeom prst="rightArrow">
+            <a:avLst/>
+          </a:prstGeom>
+          <a:ln/>
+        </p:spPr>
+        <p:style>
+          <a:lnRef idx="0">
+            <a:schemeClr val="accent1"/>
+          </a:lnRef>
+          <a:fillRef idx="3">
+            <a:schemeClr val="accent1"/>
+          </a:fillRef>
+          <a:effectRef idx="3">
+            <a:schemeClr val="accent1"/>
+          </a:effectRef>
+          <a:fontRef idx="minor">
+            <a:schemeClr val="lt1"/>
+          </a:fontRef>
+        </p:style>
+        <p:txBody>
+          <a:bodyPr rot="0" spcFirstLastPara="1" vertOverflow="overflow" horzOverflow="overflow" vert="horz" wrap="square" lIns="91439" tIns="45719" rIns="91439" bIns="45719" numCol="1" spcCol="38100" rtlCol="0" anchor="t">
+            <a:noAutofit/>
+          </a:bodyPr>
+          <a:lstStyle/>
+          <a:p>
+            <a:pPr marL="0" marR="0" indent="0" algn="l" defTabSz="914400" rtl="0" fontAlgn="auto" latinLnBrk="1" hangingPunct="0">
+              <a:lnSpc>
+                <a:spcPct val="100000"/>
+              </a:lnSpc>
+              <a:spcBef>
+                <a:spcPts val="0"/>
+              </a:spcBef>
+              <a:spcAft>
+                <a:spcPts val="0"/>
+              </a:spcAft>
+              <a:buClrTx/>
+              <a:buSzTx/>
+              <a:buFontTx/>
+              <a:buNone/>
+            </a:pPr>
+            <a:endParaRPr kumimoji="0" lang="zh-CN" altLang="en-US" sz="1800" b="0" i="0" u="none" strike="noStrike" cap="none" spc="0" normalizeH="0" baseline="0">
+              <a:ln>
+                <a:noFill/>
+              </a:ln>
+              <a:solidFill>
+                <a:srgbClr val="000000"/>
+              </a:solidFill>
+              <a:effectLst/>
+              <a:uFillTx/>
+            </a:endParaRPr>
+          </a:p>
+        </p:txBody>
+      </p:sp>
+      <p:sp>
+        <p:nvSpPr>
+          <p:cNvPr id="4" name="TextBox 3"/>
+          <p:cNvSpPr txBox="1"/>
+          <p:nvPr/>
+        </p:nvSpPr>
+        <p:spPr>
+          <a:xfrm>
+            <a:off x="16740718" y="1150935"/>
+            <a:ext cx="2806859" cy="564257"/>
+          </a:xfrm>
+          <a:prstGeom prst="rect">
+            <a:avLst/>
+          </a:prstGeom>
+          <a:noFill/>
+          <a:ln w="12700" cap="flat">
+            <a:noFill/>
+            <a:miter lim="400000"/>
+          </a:ln>
+        </p:spPr>
+        <p:style>
+          <a:lnRef idx="0">
+            <a:scrgbClr r="0" g="0" b="0"/>
+          </a:lnRef>
+          <a:fillRef idx="0">
+            <a:scrgbClr r="0" g="0" b="0"/>
+          </a:fillRef>
+          <a:effectRef idx="0">
+            <a:scrgbClr r="0" g="0" b="0"/>
+          </a:effectRef>
+          <a:fontRef idx="none"/>
+        </p:style>
+        <p:txBody>
+          <a:bodyPr rot="0" spcFirstLastPara="1" vertOverflow="overflow" horzOverflow="overflow" vert="horz" wrap="none" lIns="50800" tIns="50800" rIns="50800" bIns="50800" numCol="1" spcCol="38100" rtlCol="0" anchor="ctr">
+            <a:spAutoFit/>
+          </a:bodyPr>
+          <a:lstStyle/>
+          <a:p>
+            <a:pPr marL="0" marR="0" indent="0" algn="ctr" defTabSz="825500" rtl="0" fontAlgn="auto" latinLnBrk="0" hangingPunct="0">
+              <a:lnSpc>
+                <a:spcPct val="100000"/>
+              </a:lnSpc>
+              <a:spcBef>
+                <a:spcPts val="0"/>
+              </a:spcBef>
+              <a:spcAft>
+                <a:spcPts val="0"/>
+              </a:spcAft>
+              <a:buClrTx/>
+              <a:buSzTx/>
+              <a:buFontTx/>
+              <a:buNone/>
+            </a:pPr>
+            <a:r>
+              <a:rPr kumimoji="0" lang="zh-CN" altLang="en-US" sz="3000" b="1" i="0" u="none" strike="noStrike" cap="none" spc="0" normalizeH="0" baseline="0" dirty="0" smtClean="0">
+                <a:ln>
+                  <a:noFill/>
+                </a:ln>
+                <a:solidFill>
+                  <a:srgbClr val="000000"/>
+                </a:solidFill>
+                <a:effectLst/>
+                <a:uFillTx/>
+                <a:latin typeface="Helvetica Neue"/>
+                <a:ea typeface="Helvetica Neue"/>
+                <a:cs typeface="Helvetica Neue"/>
+                <a:sym typeface="Helvetica Neue"/>
+              </a:rPr>
+              <a:t>安装运行时环境</a:t>
+            </a:r>
+            <a:endParaRPr kumimoji="0" lang="zh-CN" altLang="en-US" sz="3000" b="1" i="0" u="none" strike="noStrike" cap="none" spc="0" normalizeH="0" baseline="0" dirty="0">
+              <a:ln>
+                <a:noFill/>
+              </a:ln>
+              <a:solidFill>
+                <a:srgbClr val="000000"/>
+              </a:solidFill>
+              <a:effectLst/>
+              <a:uFillTx/>
+              <a:latin typeface="Helvetica Neue"/>
+              <a:ea typeface="Helvetica Neue"/>
+              <a:cs typeface="Helvetica Neue"/>
+              <a:sym typeface="Helvetica Neue"/>
+            </a:endParaRPr>
+          </a:p>
+        </p:txBody>
+      </p:sp>
+      <p:sp>
+        <p:nvSpPr>
+          <p:cNvPr id="12" name="TextBox 11"/>
+          <p:cNvSpPr txBox="1"/>
+          <p:nvPr/>
+        </p:nvSpPr>
+        <p:spPr>
+          <a:xfrm>
+            <a:off x="16944528" y="8762850"/>
+            <a:ext cx="4738478" cy="564257"/>
+          </a:xfrm>
+          <a:prstGeom prst="rect">
+            <a:avLst/>
+          </a:prstGeom>
+          <a:noFill/>
+          <a:ln w="12700" cap="flat">
+            <a:noFill/>
+            <a:miter lim="400000"/>
+          </a:ln>
+        </p:spPr>
+        <p:style>
+          <a:lnRef idx="0">
+            <a:scrgbClr r="0" g="0" b="0"/>
+          </a:lnRef>
+          <a:fillRef idx="0">
+            <a:scrgbClr r="0" g="0" b="0"/>
+          </a:fillRef>
+          <a:effectRef idx="0">
+            <a:scrgbClr r="0" g="0" b="0"/>
+          </a:effectRef>
+          <a:fontRef idx="none"/>
+        </p:style>
+        <p:txBody>
+          <a:bodyPr rot="0" spcFirstLastPara="1" vertOverflow="overflow" horzOverflow="overflow" vert="horz" wrap="none" lIns="50800" tIns="50800" rIns="50800" bIns="50800" numCol="1" spcCol="38100" rtlCol="0" anchor="ctr">
+            <a:spAutoFit/>
+          </a:bodyPr>
+          <a:lstStyle/>
+          <a:p>
+            <a:pPr marL="0" marR="0" indent="0" algn="ctr" defTabSz="825500" rtl="0" fontAlgn="auto" latinLnBrk="0" hangingPunct="0">
+              <a:lnSpc>
+                <a:spcPct val="100000"/>
+              </a:lnSpc>
+              <a:spcBef>
+                <a:spcPts val="0"/>
+              </a:spcBef>
+              <a:spcAft>
+                <a:spcPts val="0"/>
+              </a:spcAft>
+              <a:buClrTx/>
+              <a:buSzTx/>
+              <a:buFontTx/>
+              <a:buNone/>
+            </a:pPr>
+            <a:r>
+              <a:rPr kumimoji="0" lang="zh-CN" altLang="en-US" sz="3000" b="1" i="0" u="none" strike="noStrike" cap="none" spc="0" normalizeH="0" baseline="0" dirty="0" smtClean="0">
+                <a:ln>
+                  <a:noFill/>
+                </a:ln>
+                <a:solidFill>
+                  <a:srgbClr val="000000"/>
+                </a:solidFill>
+                <a:effectLst/>
+                <a:uFillTx/>
+                <a:latin typeface="Helvetica Neue"/>
+                <a:ea typeface="Helvetica Neue"/>
+                <a:cs typeface="Helvetica Neue"/>
+                <a:sym typeface="Helvetica Neue"/>
+              </a:rPr>
+              <a:t>软件授权确认以及引用文献</a:t>
+            </a:r>
+            <a:endParaRPr kumimoji="0" lang="zh-CN" altLang="en-US" sz="3000" b="1" i="0" u="none" strike="noStrike" cap="none" spc="0" normalizeH="0" baseline="0" dirty="0">
+              <a:ln>
+                <a:noFill/>
+              </a:ln>
+              <a:solidFill>
+                <a:srgbClr val="000000"/>
+              </a:solidFill>
+              <a:effectLst/>
+              <a:uFillTx/>
+              <a:latin typeface="Helvetica Neue"/>
+              <a:ea typeface="Helvetica Neue"/>
+              <a:cs typeface="Helvetica Neue"/>
+              <a:sym typeface="Helvetica Neue"/>
+            </a:endParaRPr>
+          </a:p>
+        </p:txBody>
+      </p:sp>
+      <p:sp>
+        <p:nvSpPr>
+          <p:cNvPr id="13" name="TextBox 12"/>
+          <p:cNvSpPr txBox="1"/>
+          <p:nvPr/>
+        </p:nvSpPr>
+        <p:spPr>
+          <a:xfrm>
+            <a:off x="6628350" y="12396712"/>
+            <a:ext cx="1647887" cy="564257"/>
+          </a:xfrm>
+          <a:prstGeom prst="rect">
+            <a:avLst/>
+          </a:prstGeom>
+          <a:noFill/>
+          <a:ln w="12700" cap="flat">
+            <a:noFill/>
+            <a:miter lim="400000"/>
+          </a:ln>
+        </p:spPr>
+        <p:style>
+          <a:lnRef idx="0">
+            <a:scrgbClr r="0" g="0" b="0"/>
+          </a:lnRef>
+          <a:fillRef idx="0">
+            <a:scrgbClr r="0" g="0" b="0"/>
+          </a:fillRef>
+          <a:effectRef idx="0">
+            <a:scrgbClr r="0" g="0" b="0"/>
+          </a:effectRef>
+          <a:fontRef idx="none"/>
+        </p:style>
+        <p:txBody>
+          <a:bodyPr rot="0" spcFirstLastPara="1" vertOverflow="overflow" horzOverflow="overflow" vert="horz" wrap="none" lIns="50800" tIns="50800" rIns="50800" bIns="50800" numCol="1" spcCol="38100" rtlCol="0" anchor="ctr">
+            <a:spAutoFit/>
+          </a:bodyPr>
+          <a:lstStyle/>
+          <a:p>
+            <a:pPr marL="0" marR="0" indent="0" algn="ctr" defTabSz="825500" rtl="0" fontAlgn="auto" latinLnBrk="0" hangingPunct="0">
+              <a:lnSpc>
+                <a:spcPct val="100000"/>
+              </a:lnSpc>
+              <a:spcBef>
+                <a:spcPts val="0"/>
+              </a:spcBef>
+              <a:spcAft>
+                <a:spcPts val="0"/>
+              </a:spcAft>
+              <a:buClrTx/>
+              <a:buSzTx/>
+              <a:buFontTx/>
+              <a:buNone/>
+            </a:pPr>
+            <a:r>
+              <a:rPr kumimoji="0" lang="zh-CN" altLang="en-US" sz="3000" b="1" i="0" u="none" strike="noStrike" cap="none" spc="0" normalizeH="0" baseline="0" dirty="0" smtClean="0">
+                <a:ln>
+                  <a:noFill/>
+                </a:ln>
+                <a:solidFill>
+                  <a:srgbClr val="000000"/>
+                </a:solidFill>
+                <a:effectLst/>
+                <a:uFillTx/>
+                <a:latin typeface="Helvetica Neue"/>
+                <a:ea typeface="Helvetica Neue"/>
+                <a:cs typeface="Helvetica Neue"/>
+                <a:sym typeface="Helvetica Neue"/>
+              </a:rPr>
+              <a:t>成功安装</a:t>
+            </a:r>
+            <a:endParaRPr kumimoji="0" lang="zh-CN" altLang="en-US" sz="3000" b="1" i="0" u="none" strike="noStrike" cap="none" spc="0" normalizeH="0" baseline="0" dirty="0">
+              <a:ln>
+                <a:noFill/>
+              </a:ln>
+              <a:solidFill>
+                <a:srgbClr val="000000"/>
+              </a:solidFill>
+              <a:effectLst/>
+              <a:uFillTx/>
+              <a:latin typeface="Helvetica Neue"/>
+              <a:ea typeface="Helvetica Neue"/>
+              <a:cs typeface="Helvetica Neue"/>
+              <a:sym typeface="Helvetica Neue"/>
+            </a:endParaRPr>
+          </a:p>
+        </p:txBody>
+      </p:sp>
+    </p:spTree>
+    <p:extLst>
+      <p:ext uri="{BB962C8B-B14F-4D97-AF65-F5344CB8AC3E}">
+        <p14:creationId xmlns:p14="http://schemas.microsoft.com/office/powerpoint/2010/main" val="3653947603"/>
+      </p:ext>
+    </p:extLst>
+  </p:cSld>
+  <p:clrMapOvr>
+    <a:masterClrMapping/>
+  </p:clrMapOvr>
+  <p:transition spd="slow">
+    <p:push dir="u"/>
+  </p:transition>
+  <p:timing>
+    <p:tnLst>
+      <p:par>
+        <p:cTn id="1" dur="indefinite" restart="never" nodeType="tmRoot"/>
+      </p:par>
+    </p:tnLst>
+  </p:timing>
+</p:sld>
+</file>
+
+<file path=ppt/slides/slide4.xml><?xml version="1.0" encoding="utf-8"?>
+<p:sld xmlns:a="http://schemas.openxmlformats.org/drawingml/2006/main" xmlns:r="http://schemas.openxmlformats.org/officeDocument/2006/relationships" xmlns:p="http://schemas.openxmlformats.org/presentationml/2006/main">
+  <p:cSld>
+    <p:spTree>
+      <p:nvGrpSpPr>
+        <p:cNvPr id="1" name=""/>
+        <p:cNvGrpSpPr/>
+        <p:nvPr/>
+      </p:nvGrpSpPr>
+      <p:grpSpPr>
+        <a:xfrm>
+          <a:off x="0" y="0"/>
+          <a:ext cx="0" cy="0"/>
+          <a:chOff x="0" y="0"/>
+          <a:chExt cx="0" cy="0"/>
+        </a:xfrm>
+      </p:grpSpPr>
+      <p:pic>
+        <p:nvPicPr>
           <p:cNvPr id="153" name="图像" descr="图像"/>
           <p:cNvPicPr>
             <a:picLocks noChangeAspect="1"/>
@@ -2485,14 +3641,13 @@
               <a:rPr lang="zh-CN" altLang="en-US" dirty="0" smtClean="0"/>
               <a:t>软件主界面说明</a:t>
             </a:r>
-            <a:endParaRPr lang="zh-CN" altLang="en-US" dirty="0" smtClean="0"/>
           </a:p>
         </p:txBody>
       </p:sp>
     </p:spTree>
     <p:extLst>
       <p:ext uri="{BB962C8B-B14F-4D97-AF65-F5344CB8AC3E}">
-        <p14:creationId xmlns:p14="http://schemas.microsoft.com/office/powerpoint/2010/main" val="3653947603"/>
+        <p14:creationId xmlns:p14="http://schemas.microsoft.com/office/powerpoint/2010/main" val="3669985594"/>
       </p:ext>
     </p:extLst>
   </p:cSld>
@@ -2512,7 +3667,289 @@
 </p:sld>
 </file>
 
-<file path=ppt/slides/slide4.xml><?xml version="1.0" encoding="utf-8"?>
+<file path=ppt/slides/slide5.xml><?xml version="1.0" encoding="utf-8"?>
+<p:sld xmlns:a="http://schemas.openxmlformats.org/drawingml/2006/main" xmlns:r="http://schemas.openxmlformats.org/officeDocument/2006/relationships" xmlns:p="http://schemas.openxmlformats.org/presentationml/2006/main">
+  <p:cSld>
+    <p:spTree>
+      <p:nvGrpSpPr>
+        <p:cNvPr id="1" name=""/>
+        <p:cNvGrpSpPr/>
+        <p:nvPr/>
+      </p:nvGrpSpPr>
+      <p:grpSpPr>
+        <a:xfrm>
+          <a:off x="0" y="0"/>
+          <a:ext cx="0" cy="0"/>
+          <a:chOff x="0" y="0"/>
+          <a:chExt cx="0" cy="0"/>
+        </a:xfrm>
+      </p:grpSpPr>
+      <p:pic>
+        <p:nvPicPr>
+          <p:cNvPr id="153" name="图像" descr="图像"/>
+          <p:cNvPicPr>
+            <a:picLocks noChangeAspect="1"/>
+          </p:cNvPicPr>
+          <p:nvPr/>
+        </p:nvPicPr>
+        <p:blipFill>
+          <a:blip r:embed="rId3"/>
+          <a:stretch>
+            <a:fillRect/>
+          </a:stretch>
+        </p:blipFill>
+        <p:spPr>
+          <a:xfrm>
+            <a:off x="-1" y="755652"/>
+            <a:ext cx="24384001" cy="952498"/>
+          </a:xfrm>
+          <a:prstGeom prst="rect">
+            <a:avLst/>
+          </a:prstGeom>
+          <a:ln w="12700">
+            <a:miter lim="400000"/>
+            <a:headEnd/>
+            <a:tailEnd/>
+          </a:ln>
+        </p:spPr>
+      </p:pic>
+      <p:pic>
+        <p:nvPicPr>
+          <p:cNvPr id="154" name="图像" descr="图像"/>
+          <p:cNvPicPr>
+            <a:picLocks noChangeAspect="1"/>
+          </p:cNvPicPr>
+          <p:nvPr/>
+        </p:nvPicPr>
+        <p:blipFill>
+          <a:blip r:embed="rId4"/>
+          <a:stretch>
+            <a:fillRect/>
+          </a:stretch>
+        </p:blipFill>
+        <p:spPr>
+          <a:xfrm>
+            <a:off x="18528704" y="8762850"/>
+            <a:ext cx="5855296" cy="4953149"/>
+          </a:xfrm>
+          <a:prstGeom prst="rect">
+            <a:avLst/>
+          </a:prstGeom>
+          <a:ln w="12700">
+            <a:miter lim="400000"/>
+            <a:headEnd/>
+            <a:tailEnd/>
+          </a:ln>
+        </p:spPr>
+      </p:pic>
+      <p:sp>
+        <p:nvSpPr>
+          <p:cNvPr id="155" name="内容标题（55点75w）"/>
+          <p:cNvSpPr txBox="1"/>
+          <p:nvPr/>
+        </p:nvSpPr>
+        <p:spPr>
+          <a:xfrm>
+            <a:off x="696721" y="719311"/>
+            <a:ext cx="5062283" cy="948978"/>
+          </a:xfrm>
+          <a:prstGeom prst="rect">
+            <a:avLst/>
+          </a:prstGeom>
+          <a:ln w="12700">
+            <a:miter lim="400000"/>
+          </a:ln>
+        </p:spPr>
+        <p:txBody>
+          <a:bodyPr wrap="none" lIns="50800" tIns="50800" rIns="50800" bIns="50800" anchor="ctr">
+            <a:spAutoFit/>
+          </a:bodyPr>
+          <a:lstStyle>
+            <a:lvl1pPr algn="l">
+              <a:defRPr sz="5500">
+                <a:solidFill>
+                  <a:srgbClr val="555E63"/>
+                </a:solidFill>
+                <a:latin typeface="HYQiHei-GEW"/>
+                <a:ea typeface="HYQiHei-GEW"/>
+                <a:cs typeface="HYQiHei-GEW"/>
+                <a:sym typeface="HYQiHei-GEW"/>
+              </a:defRPr>
+            </a:lvl1pPr>
+          </a:lstStyle>
+          <a:p>
+            <a:r>
+              <a:rPr lang="zh-CN" altLang="en-US" dirty="0" smtClean="0"/>
+              <a:t>软件主界面说明</a:t>
+            </a:r>
+          </a:p>
+        </p:txBody>
+      </p:sp>
+    </p:spTree>
+    <p:extLst>
+      <p:ext uri="{BB962C8B-B14F-4D97-AF65-F5344CB8AC3E}">
+        <p14:creationId xmlns:p14="http://schemas.microsoft.com/office/powerpoint/2010/main" val="3669985594"/>
+      </p:ext>
+    </p:extLst>
+  </p:cSld>
+  <p:clrMapOvr>
+    <a:masterClrMapping/>
+  </p:clrMapOvr>
+  <p:transition spd="slow">
+    <p:push dir="u"/>
+  </p:transition>
+  <p:timing>
+    <p:tnLst>
+      <p:par>
+        <p:cTn id="1" dur="indefinite" restart="never" nodeType="tmRoot"/>
+      </p:par>
+    </p:tnLst>
+  </p:timing>
+</p:sld>
+</file>
+
+<file path=ppt/slides/slide6.xml><?xml version="1.0" encoding="utf-8"?>
+<p:sld xmlns:a="http://schemas.openxmlformats.org/drawingml/2006/main" xmlns:r="http://schemas.openxmlformats.org/officeDocument/2006/relationships" xmlns:p="http://schemas.openxmlformats.org/presentationml/2006/main">
+  <p:cSld>
+    <p:spTree>
+      <p:nvGrpSpPr>
+        <p:cNvPr id="1" name=""/>
+        <p:cNvGrpSpPr/>
+        <p:nvPr/>
+      </p:nvGrpSpPr>
+      <p:grpSpPr>
+        <a:xfrm>
+          <a:off x="0" y="0"/>
+          <a:ext cx="0" cy="0"/>
+          <a:chOff x="0" y="0"/>
+          <a:chExt cx="0" cy="0"/>
+        </a:xfrm>
+      </p:grpSpPr>
+      <p:pic>
+        <p:nvPicPr>
+          <p:cNvPr id="153" name="图像" descr="图像"/>
+          <p:cNvPicPr>
+            <a:picLocks noChangeAspect="1"/>
+          </p:cNvPicPr>
+          <p:nvPr/>
+        </p:nvPicPr>
+        <p:blipFill>
+          <a:blip r:embed="rId3"/>
+          <a:stretch>
+            <a:fillRect/>
+          </a:stretch>
+        </p:blipFill>
+        <p:spPr>
+          <a:xfrm>
+            <a:off x="-1" y="755652"/>
+            <a:ext cx="24384001" cy="952498"/>
+          </a:xfrm>
+          <a:prstGeom prst="rect">
+            <a:avLst/>
+          </a:prstGeom>
+          <a:ln w="12700">
+            <a:miter lim="400000"/>
+            <a:headEnd/>
+            <a:tailEnd/>
+          </a:ln>
+        </p:spPr>
+      </p:pic>
+      <p:pic>
+        <p:nvPicPr>
+          <p:cNvPr id="154" name="图像" descr="图像"/>
+          <p:cNvPicPr>
+            <a:picLocks noChangeAspect="1"/>
+          </p:cNvPicPr>
+          <p:nvPr/>
+        </p:nvPicPr>
+        <p:blipFill>
+          <a:blip r:embed="rId4"/>
+          <a:stretch>
+            <a:fillRect/>
+          </a:stretch>
+        </p:blipFill>
+        <p:spPr>
+          <a:xfrm>
+            <a:off x="18528704" y="8762850"/>
+            <a:ext cx="5855296" cy="4953149"/>
+          </a:xfrm>
+          <a:prstGeom prst="rect">
+            <a:avLst/>
+          </a:prstGeom>
+          <a:ln w="12700">
+            <a:miter lim="400000"/>
+            <a:headEnd/>
+            <a:tailEnd/>
+          </a:ln>
+        </p:spPr>
+      </p:pic>
+      <p:sp>
+        <p:nvSpPr>
+          <p:cNvPr id="155" name="内容标题（55点75w）"/>
+          <p:cNvSpPr txBox="1"/>
+          <p:nvPr/>
+        </p:nvSpPr>
+        <p:spPr>
+          <a:xfrm>
+            <a:off x="696721" y="719311"/>
+            <a:ext cx="5062283" cy="948978"/>
+          </a:xfrm>
+          <a:prstGeom prst="rect">
+            <a:avLst/>
+          </a:prstGeom>
+          <a:ln w="12700">
+            <a:miter lim="400000"/>
+          </a:ln>
+        </p:spPr>
+        <p:txBody>
+          <a:bodyPr wrap="none" lIns="50800" tIns="50800" rIns="50800" bIns="50800" anchor="ctr">
+            <a:spAutoFit/>
+          </a:bodyPr>
+          <a:lstStyle>
+            <a:lvl1pPr algn="l">
+              <a:defRPr sz="5500">
+                <a:solidFill>
+                  <a:srgbClr val="555E63"/>
+                </a:solidFill>
+                <a:latin typeface="HYQiHei-GEW"/>
+                <a:ea typeface="HYQiHei-GEW"/>
+                <a:cs typeface="HYQiHei-GEW"/>
+                <a:sym typeface="HYQiHei-GEW"/>
+              </a:defRPr>
+            </a:lvl1pPr>
+          </a:lstStyle>
+          <a:p>
+            <a:r>
+              <a:rPr lang="zh-CN" altLang="en-US" dirty="0" smtClean="0"/>
+              <a:t>软件主界面说明</a:t>
+            </a:r>
+          </a:p>
+        </p:txBody>
+      </p:sp>
+    </p:spTree>
+    <p:extLst>
+      <p:ext uri="{BB962C8B-B14F-4D97-AF65-F5344CB8AC3E}">
+        <p14:creationId xmlns:p14="http://schemas.microsoft.com/office/powerpoint/2010/main" val="3669985594"/>
+      </p:ext>
+    </p:extLst>
+  </p:cSld>
+  <p:clrMapOvr>
+    <a:masterClrMapping/>
+  </p:clrMapOvr>
+  <p:transition spd="slow">
+    <p:push dir="u"/>
+  </p:transition>
+  <p:timing>
+    <p:tnLst>
+      <p:par>
+        <p:cTn id="1" dur="indefinite" restart="never" nodeType="tmRoot"/>
+      </p:par>
+    </p:tnLst>
+  </p:timing>
+</p:sld>
+</file>
+
+<file path=ppt/slides/slide7.xml><?xml version="1.0" encoding="utf-8"?>
 <p:sld xmlns:a="http://schemas.openxmlformats.org/drawingml/2006/main" xmlns:r="http://schemas.openxmlformats.org/officeDocument/2006/relationships" xmlns:p="http://schemas.openxmlformats.org/presentationml/2006/main">
   <p:cSld>
     <p:spTree>
@@ -3668,7 +5105,7 @@
   <a:extraClrSchemeLst/>
   <a:extLst>
     <a:ext uri="{05A4C25C-085E-4340-85A3-A5531E510DB2}">
-      <thm15:themeFamily xmlns:thm15="http://schemas.microsoft.com/office/thememl/2012/main" xmlns="" name="Office Theme" id="{62F939B6-93AF-4DB8-9C6B-D6C7DFDC589F}" vid="{4A3C46E8-61CC-4603-A589-7422A47A8E4A}"/>
+      <thm15:themeFamily xmlns="" xmlns:thm15="http://schemas.microsoft.com/office/thememl/2012/main" name="Office Theme" id="{62F939B6-93AF-4DB8-9C6B-D6C7DFDC589F}" vid="{4A3C46E8-61CC-4603-A589-7422A47A8E4A}"/>
     </a:ext>
   </a:extLst>
 </a:theme>
@@ -4707,7 +6144,7 @@
   <a:extraClrSchemeLst/>
   <a:extLst>
     <a:ext uri="{05A4C25C-085E-4340-85A3-A5531E510DB2}">
-      <thm15:themeFamily xmlns:thm15="http://schemas.microsoft.com/office/thememl/2012/main" xmlns="" name="Office Theme" id="{62F939B6-93AF-4DB8-9C6B-D6C7DFDC589F}" vid="{4A3C46E8-61CC-4603-A589-7422A47A8E4A}"/>
+      <thm15:themeFamily xmlns="" xmlns:thm15="http://schemas.microsoft.com/office/thememl/2012/main" name="Office Theme" id="{62F939B6-93AF-4DB8-9C6B-D6C7DFDC589F}" vid="{4A3C46E8-61CC-4603-A589-7422A47A8E4A}"/>
     </a:ext>
   </a:extLst>
 </a:theme>

</xml_diff>